<commit_message>
Fixed typo in 3/15 title slide, added pdf files for slides
</commit_message>
<xml_diff>
--- a/slides/dijkstraAndPrim.pptx
+++ b/slides/dijkstraAndPrim.pptx
@@ -5123,15 +5123,7 @@
           <a:p>
             <a:r>
               <a:rPr lang="en-US" dirty="0"/>
-              <a:t>Graphs – </a:t>
-            </a:r>
-            <a:r>
-              <a:rPr lang="en-US" dirty="0" err="1"/>
-              <a:t>Dijstra’s</a:t>
-            </a:r>
-            <a:r>
-              <a:rPr lang="en-US" dirty="0"/>
-              <a:t>, Prim’s, Indirect Heaps</a:t>
+              <a:t>Graphs – Dijkstra’s, Prim’s, Indirect Heaps</a:t>
             </a:r>
           </a:p>
         </p:txBody>
@@ -5151,7 +5143,23 @@
           <a:bodyPr/>
           <a:lstStyle/>
           <a:p>
+            <a:r>
+              <a:rPr lang="en-US" dirty="0"/>
+              <a:t>CS4102, Spring 2021</a:t>
+            </a:r>
+          </a:p>
+          <a:p>
             <a:endParaRPr lang="en-US" dirty="0"/>
+          </a:p>
+          <a:p>
+            <a:r>
+              <a:rPr lang="en-US"/>
+              <a:t>Readings</a:t>
+            </a:r>
+            <a:r>
+              <a:rPr lang="en-US" dirty="0"/>
+              <a:t>: CLRS 23.2, 24.2, 24.3</a:t>
+            </a:r>
           </a:p>
         </p:txBody>
       </p:sp>

</xml_diff>

<commit_message>
link to prim slides
</commit_message>
<xml_diff>
--- a/slides/dijkstraAndPrim.pptx
+++ b/slides/dijkstraAndPrim.pptx
@@ -5150,7 +5150,7 @@
           <a:p>
             <a:r>
               <a:rPr lang="en-US" dirty="0"/>
-              <a:t>CS4102, Spring 2021</a:t>
+              <a:t>CS4102, Fall 2021</a:t>
             </a:r>
           </a:p>
           <a:p>
@@ -5158,12 +5158,8 @@
           </a:p>
           <a:p>
             <a:r>
-              <a:rPr lang="en-US"/>
-              <a:t>Readings</a:t>
-            </a:r>
-            <a:r>
               <a:rPr lang="en-US" dirty="0"/>
-              <a:t>: CLRS 23.2, 24.2, 24.3</a:t>
+              <a:t>Readings: CLRS 23.2, 24.2, 24.3</a:t>
             </a:r>
           </a:p>
         </p:txBody>

</xml_diff>

<commit_message>
formatting tweaks to slides
</commit_message>
<xml_diff>
--- a/slides/dijkstraAndPrim.pptx
+++ b/slides/dijkstraAndPrim.pptx
@@ -11300,6 +11300,7 @@
             </a:r>
           </a:p>
           <a:p>
+            <a:pPr algn="l"/>
             <a:r>
               <a:rPr lang="en-US" sz="2800" dirty="0"/>
               <a:t>Can this lead to an infeasible solution?</a:t>
@@ -11423,8 +11424,8 @@
               </a:lnSpc>
             </a:pPr>
             <a:r>
-              <a:rPr lang="en-US" sz="2800"/>
-              <a:t>Candidates edges:  edge from a tree-node to a non-tree node</a:t>
+              <a:rPr lang="en-US" sz="2800" dirty="0"/>
+              <a:t>Candidate edges:  edge from a tree-node to a non-tree node</a:t>
             </a:r>
           </a:p>
           <a:p>
@@ -11434,7 +11435,7 @@
               </a:lnSpc>
             </a:pPr>
             <a:r>
-              <a:rPr lang="en-US" sz="2400"/>
+              <a:rPr lang="en-US" sz="2400" dirty="0"/>
               <a:t>Since we’ll choose smallest, keep only one candidate edge for each non-tree node</a:t>
             </a:r>
           </a:p>
@@ -11445,7 +11446,7 @@
               </a:lnSpc>
             </a:pPr>
             <a:r>
-              <a:rPr lang="en-US" sz="2400"/>
+              <a:rPr lang="en-US" sz="2400" dirty="0"/>
               <a:t>But, may need to make sure we always have the smallest edge for each non-tree node</a:t>
             </a:r>
           </a:p>
@@ -11456,7 +11457,7 @@
               </a:lnSpc>
             </a:pPr>
             <a:r>
-              <a:rPr lang="en-US" sz="2800"/>
+              <a:rPr lang="en-US" sz="2800" dirty="0"/>
               <a:t>Fringe-nodes: non-trees nodes adjacent to the tree</a:t>
             </a:r>
           </a:p>
@@ -11467,7 +11468,7 @@
               </a:lnSpc>
             </a:pPr>
             <a:r>
-              <a:rPr lang="en-US" sz="2800"/>
+              <a:rPr lang="en-US" sz="2800" dirty="0"/>
               <a:t>Need data structure to hold fringe-nodes</a:t>
             </a:r>
           </a:p>
@@ -11478,7 +11479,7 @@
               </a:lnSpc>
             </a:pPr>
             <a:r>
-              <a:rPr lang="en-US" sz="2400"/>
+              <a:rPr lang="en-US" sz="2400" dirty="0"/>
               <a:t>Priority queue, ordered by min-edge weight</a:t>
             </a:r>
           </a:p>
@@ -11489,7 +11490,7 @@
               </a:lnSpc>
             </a:pPr>
             <a:r>
-              <a:rPr lang="en-US" sz="2400"/>
+              <a:rPr lang="en-US" sz="2400" dirty="0"/>
               <a:t>May need to update priorities!</a:t>
             </a:r>
           </a:p>
@@ -11499,7 +11500,7 @@
                 <a:spcPct val="90000"/>
               </a:lnSpc>
             </a:pPr>
-            <a:endParaRPr lang="en-US" sz="2800"/>
+            <a:endParaRPr lang="en-US" sz="2800" dirty="0"/>
           </a:p>
         </p:txBody>
       </p:sp>

</xml_diff>